<commit_message>
Change development clinic name
Development clinic name changed to level 2 development clinic
</commit_message>
<xml_diff>
--- a/Softball Victoria - Umpiring Development Pathway.pptx
+++ b/Softball Victoria - Umpiring Development Pathway.pptx
@@ -192,7 +192,7 @@
           <a:p>
             <a:fld id="{73586D86-7C01-480E-8A4F-29C229566B14}" type="datetimeFigureOut">
               <a:rPr lang="en-AU" smtClean="0"/>
-              <a:t>21/10/2013</a:t>
+              <a:t>22/10/2013</a:t>
             </a:fld>
             <a:endParaRPr lang="en-AU"/>
           </a:p>
@@ -641,7 +641,7 @@
           <a:p>
             <a:fld id="{1B4E8F53-0624-4A0E-8A35-4E16BE9BEDB0}" type="datetimeFigureOut">
               <a:rPr lang="en-AU" smtClean="0"/>
-              <a:t>21/10/2013</a:t>
+              <a:t>22/10/2013</a:t>
             </a:fld>
             <a:endParaRPr lang="en-AU"/>
           </a:p>
@@ -811,7 +811,7 @@
           <a:p>
             <a:fld id="{1B4E8F53-0624-4A0E-8A35-4E16BE9BEDB0}" type="datetimeFigureOut">
               <a:rPr lang="en-AU" smtClean="0"/>
-              <a:t>21/10/2013</a:t>
+              <a:t>22/10/2013</a:t>
             </a:fld>
             <a:endParaRPr lang="en-AU"/>
           </a:p>
@@ -991,7 +991,7 @@
           <a:p>
             <a:fld id="{1B4E8F53-0624-4A0E-8A35-4E16BE9BEDB0}" type="datetimeFigureOut">
               <a:rPr lang="en-AU" smtClean="0"/>
-              <a:t>21/10/2013</a:t>
+              <a:t>22/10/2013</a:t>
             </a:fld>
             <a:endParaRPr lang="en-AU"/>
           </a:p>
@@ -1161,7 +1161,7 @@
           <a:p>
             <a:fld id="{1B4E8F53-0624-4A0E-8A35-4E16BE9BEDB0}" type="datetimeFigureOut">
               <a:rPr lang="en-AU" smtClean="0"/>
-              <a:t>21/10/2013</a:t>
+              <a:t>22/10/2013</a:t>
             </a:fld>
             <a:endParaRPr lang="en-AU"/>
           </a:p>
@@ -1407,7 +1407,7 @@
           <a:p>
             <a:fld id="{1B4E8F53-0624-4A0E-8A35-4E16BE9BEDB0}" type="datetimeFigureOut">
               <a:rPr lang="en-AU" smtClean="0"/>
-              <a:t>21/10/2013</a:t>
+              <a:t>22/10/2013</a:t>
             </a:fld>
             <a:endParaRPr lang="en-AU"/>
           </a:p>
@@ -1695,7 +1695,7 @@
           <a:p>
             <a:fld id="{1B4E8F53-0624-4A0E-8A35-4E16BE9BEDB0}" type="datetimeFigureOut">
               <a:rPr lang="en-AU" smtClean="0"/>
-              <a:t>21/10/2013</a:t>
+              <a:t>22/10/2013</a:t>
             </a:fld>
             <a:endParaRPr lang="en-AU"/>
           </a:p>
@@ -2117,7 +2117,7 @@
           <a:p>
             <a:fld id="{1B4E8F53-0624-4A0E-8A35-4E16BE9BEDB0}" type="datetimeFigureOut">
               <a:rPr lang="en-AU" smtClean="0"/>
-              <a:t>21/10/2013</a:t>
+              <a:t>22/10/2013</a:t>
             </a:fld>
             <a:endParaRPr lang="en-AU"/>
           </a:p>
@@ -2235,7 +2235,7 @@
           <a:p>
             <a:fld id="{1B4E8F53-0624-4A0E-8A35-4E16BE9BEDB0}" type="datetimeFigureOut">
               <a:rPr lang="en-AU" smtClean="0"/>
-              <a:t>21/10/2013</a:t>
+              <a:t>22/10/2013</a:t>
             </a:fld>
             <a:endParaRPr lang="en-AU"/>
           </a:p>
@@ -2330,7 +2330,7 @@
           <a:p>
             <a:fld id="{1B4E8F53-0624-4A0E-8A35-4E16BE9BEDB0}" type="datetimeFigureOut">
               <a:rPr lang="en-AU" smtClean="0"/>
-              <a:t>21/10/2013</a:t>
+              <a:t>22/10/2013</a:t>
             </a:fld>
             <a:endParaRPr lang="en-AU"/>
           </a:p>
@@ -2607,7 +2607,7 @@
           <a:p>
             <a:fld id="{1B4E8F53-0624-4A0E-8A35-4E16BE9BEDB0}" type="datetimeFigureOut">
               <a:rPr lang="en-AU" smtClean="0"/>
-              <a:t>21/10/2013</a:t>
+              <a:t>22/10/2013</a:t>
             </a:fld>
             <a:endParaRPr lang="en-AU"/>
           </a:p>
@@ -2860,7 +2860,7 @@
           <a:p>
             <a:fld id="{1B4E8F53-0624-4A0E-8A35-4E16BE9BEDB0}" type="datetimeFigureOut">
               <a:rPr lang="en-AU" smtClean="0"/>
-              <a:t>21/10/2013</a:t>
+              <a:t>22/10/2013</a:t>
             </a:fld>
             <a:endParaRPr lang="en-AU"/>
           </a:p>
@@ -3087,7 +3087,7 @@
           <a:p>
             <a:fld id="{1B4E8F53-0624-4A0E-8A35-4E16BE9BEDB0}" type="datetimeFigureOut">
               <a:rPr lang="en-AU" smtClean="0"/>
-              <a:t>21/10/2013</a:t>
+              <a:t>22/10/2013</a:t>
             </a:fld>
             <a:endParaRPr lang="en-AU"/>
           </a:p>
@@ -6259,12 +6259,20 @@
               <a:buChar char=""/>
             </a:pPr>
             <a:r>
+              <a:rPr lang="en-AU" sz="950" smtClean="0">
+                <a:effectLst/>
+                <a:latin typeface="Arial"/>
+                <a:ea typeface="Times New Roman"/>
+              </a:rPr>
+              <a:t>Level 2 Development </a:t>
+            </a:r>
+            <a:r>
               <a:rPr lang="en-AU" sz="950" dirty="0">
                 <a:effectLst/>
                 <a:latin typeface="Arial"/>
                 <a:ea typeface="Times New Roman"/>
               </a:rPr>
-              <a:t>Development Umpire Clinic</a:t>
+              <a:t>Umpire Clinic</a:t>
             </a:r>
             <a:endParaRPr lang="en-AU" sz="950" dirty="0">
               <a:effectLst/>

</xml_diff>